<commit_message>
Reworking course for computing camp
</commit_message>
<xml_diff>
--- a/topic02/talk/a-scratch-variables-operators.pptx
+++ b/topic02/talk/a-scratch-variables-operators.pptx
@@ -5,7 +5,7 @@
     <p:sldMasterId id="2147483648" r:id="rId1"/>
   </p:sldMasterIdLst>
   <p:notesMasterIdLst>
-    <p:notesMasterId r:id="rId19"/>
+    <p:notesMasterId r:id="rId18"/>
   </p:notesMasterIdLst>
   <p:sldIdLst>
     <p:sldId id="256" r:id="rId2"/>
@@ -24,7 +24,6 @@
     <p:sldId id="330" r:id="rId15"/>
     <p:sldId id="318" r:id="rId16"/>
     <p:sldId id="291" r:id="rId17"/>
-    <p:sldId id="290" r:id="rId18"/>
   </p:sldIdLst>
   <p:sldSz cx="9144000" cy="6858000" type="screen4x3"/>
   <p:notesSz cx="6858000" cy="9144000"/>
@@ -123,6 +122,22 @@
       </a:defRPr>
     </a:lvl9pPr>
   </p:defaultTextStyle>
+  <p:extLst>
+    <p:ext uri="{EFAFB233-063F-42B5-8137-9DF3F51BA10A}">
+      <p15:sldGuideLst xmlns:p15="http://schemas.microsoft.com/office/powerpoint/2012/main">
+        <p15:guide id="1" orient="horz" pos="2160">
+          <p15:clr>
+            <a:srgbClr val="A4A3A4"/>
+          </p15:clr>
+        </p15:guide>
+        <p15:guide id="2" pos="2880">
+          <p15:clr>
+            <a:srgbClr val="A4A3A4"/>
+          </p15:clr>
+        </p15:guide>
+      </p15:sldGuideLst>
+    </p:ext>
+  </p:extLst>
 </p:presentation>
 </file>
 
@@ -208,7 +223,7 @@
           <a:p>
             <a:fld id="{58C3D141-1E1C-433C-AD3A-CD56CBBB4F9F}" type="datetimeFigureOut">
               <a:rPr lang="en-IE" smtClean="0"/>
-              <a:t>25/05/2016</a:t>
+              <a:t>02/06/2016</a:t>
             </a:fld>
             <a:endParaRPr lang="en-IE"/>
           </a:p>
@@ -658,7 +673,7 @@
             <a:fld id="{1D8BD707-D9CF-40AE-B4C6-C98DA3205C09}" type="datetimeFigureOut">
               <a:rPr lang="en-US" smtClean="0"/>
               <a:pPr/>
-              <a:t>5/25/2016</a:t>
+              <a:t>6/2/2016</a:t>
             </a:fld>
             <a:endParaRPr lang="en-US"/>
           </a:p>
@@ -832,7 +847,7 @@
             <a:fld id="{1D8BD707-D9CF-40AE-B4C6-C98DA3205C09}" type="datetimeFigureOut">
               <a:rPr lang="en-US" smtClean="0"/>
               <a:pPr/>
-              <a:t>5/25/2016</a:t>
+              <a:t>6/2/2016</a:t>
             </a:fld>
             <a:endParaRPr lang="en-US"/>
           </a:p>
@@ -1016,7 +1031,7 @@
             <a:fld id="{1D8BD707-D9CF-40AE-B4C6-C98DA3205C09}" type="datetimeFigureOut">
               <a:rPr lang="en-US" smtClean="0"/>
               <a:pPr/>
-              <a:t>5/25/2016</a:t>
+              <a:t>6/2/2016</a:t>
             </a:fld>
             <a:endParaRPr lang="en-US"/>
           </a:p>
@@ -1201,7 +1216,7 @@
             <a:fld id="{1D8BD707-D9CF-40AE-B4C6-C98DA3205C09}" type="datetimeFigureOut">
               <a:rPr lang="en-US" smtClean="0"/>
               <a:pPr/>
-              <a:t>5/25/2016</a:t>
+              <a:t>6/2/2016</a:t>
             </a:fld>
             <a:endParaRPr lang="en-US"/>
           </a:p>
@@ -1489,7 +1504,7 @@
             <a:fld id="{1D8BD707-D9CF-40AE-B4C6-C98DA3205C09}" type="datetimeFigureOut">
               <a:rPr lang="en-US" smtClean="0"/>
               <a:pPr/>
-              <a:t>5/25/2016</a:t>
+              <a:t>6/2/2016</a:t>
             </a:fld>
             <a:endParaRPr lang="en-US"/>
           </a:p>
@@ -1792,7 +1807,7 @@
             <a:fld id="{1D8BD707-D9CF-40AE-B4C6-C98DA3205C09}" type="datetimeFigureOut">
               <a:rPr lang="en-US" smtClean="0"/>
               <a:pPr/>
-              <a:t>5/25/2016</a:t>
+              <a:t>6/2/2016</a:t>
             </a:fld>
             <a:endParaRPr lang="en-US"/>
           </a:p>
@@ -2260,7 +2275,7 @@
             <a:fld id="{1D8BD707-D9CF-40AE-B4C6-C98DA3205C09}" type="datetimeFigureOut">
               <a:rPr lang="en-US" smtClean="0"/>
               <a:pPr/>
-              <a:t>5/25/2016</a:t>
+              <a:t>6/2/2016</a:t>
             </a:fld>
             <a:endParaRPr lang="en-US"/>
           </a:p>
@@ -2428,7 +2443,7 @@
             <a:fld id="{1D8BD707-D9CF-40AE-B4C6-C98DA3205C09}" type="datetimeFigureOut">
               <a:rPr lang="en-US" smtClean="0"/>
               <a:pPr/>
-              <a:t>5/25/2016</a:t>
+              <a:t>6/2/2016</a:t>
             </a:fld>
             <a:endParaRPr lang="en-US"/>
           </a:p>
@@ -2562,7 +2577,7 @@
             <a:fld id="{1D8BD707-D9CF-40AE-B4C6-C98DA3205C09}" type="datetimeFigureOut">
               <a:rPr lang="en-US" smtClean="0"/>
               <a:pPr/>
-              <a:t>5/25/2016</a:t>
+              <a:t>6/2/2016</a:t>
             </a:fld>
             <a:endParaRPr lang="en-US"/>
           </a:p>
@@ -2843,7 +2858,7 @@
             <a:fld id="{1D8BD707-D9CF-40AE-B4C6-C98DA3205C09}" type="datetimeFigureOut">
               <a:rPr lang="en-US" smtClean="0"/>
               <a:pPr/>
-              <a:t>5/25/2016</a:t>
+              <a:t>6/2/2016</a:t>
             </a:fld>
             <a:endParaRPr lang="en-US"/>
           </a:p>
@@ -3100,7 +3115,7 @@
             <a:fld id="{1D8BD707-D9CF-40AE-B4C6-C98DA3205C09}" type="datetimeFigureOut">
               <a:rPr lang="en-US" smtClean="0"/>
               <a:pPr/>
-              <a:t>5/25/2016</a:t>
+              <a:t>6/2/2016</a:t>
             </a:fld>
             <a:endParaRPr lang="en-US"/>
           </a:p>
@@ -3317,7 +3332,7 @@
             <a:fld id="{1D8BD707-D9CF-40AE-B4C6-C98DA3205C09}" type="datetimeFigureOut">
               <a:rPr lang="en-US" smtClean="0"/>
               <a:pPr/>
-              <a:t>5/25/2016</a:t>
+              <a:t>6/2/2016</a:t>
             </a:fld>
             <a:endParaRPr lang="en-US"/>
           </a:p>
@@ -3720,11 +3735,7 @@
             <a:pPr algn="l"/>
             <a:r>
               <a:rPr lang="en-IE" sz="4000" dirty="0" smtClean="0"/>
-              <a:t>Introduction to </a:t>
-            </a:r>
-            <a:r>
-              <a:rPr lang="en-IE" sz="4000" dirty="0" smtClean="0"/>
-              <a:t>Coding</a:t>
+              <a:t>Introduction to Coding</a:t>
             </a:r>
             <a:endParaRPr lang="en-IE" sz="4000" dirty="0"/>
           </a:p>
@@ -4126,7 +4137,15 @@
             </a:r>
             <a:r>
               <a:rPr lang="en-IE" sz="3000" dirty="0" smtClean="0"/>
-              <a:t> time (press the ‘a’ key a 4</a:t>
+              <a:t> time </a:t>
+            </a:r>
+            <a:r>
+              <a:rPr lang="en-IE" sz="3000" dirty="0" smtClean="0"/>
+              <a:t>(i.e. they press </a:t>
+            </a:r>
+            <a:r>
+              <a:rPr lang="en-IE" sz="3000" dirty="0" smtClean="0"/>
+              <a:t>the ‘a’ key a 4</a:t>
             </a:r>
             <a:r>
               <a:rPr lang="en-IE" sz="3000" baseline="30000" dirty="0" smtClean="0"/>
@@ -4732,8 +4751,20 @@
                 <a:tableStyleId>{5940675A-B579-460E-94D1-54222C63F5DA}</a:tableStyleId>
               </a:tblPr>
               <a:tblGrid>
-                <a:gridCol w="4166074"/>
-                <a:gridCol w="3453926"/>
+                <a:gridCol w="4166074">
+                  <a:extLst>
+                    <a:ext uri="{9D8B030D-6E8A-4147-A177-3AD203B41FA5}">
+                      <a16:colId xmlns:a16="http://schemas.microsoft.com/office/drawing/2014/main" val="20000"/>
+                    </a:ext>
+                  </a:extLst>
+                </a:gridCol>
+                <a:gridCol w="3453926">
+                  <a:extLst>
+                    <a:ext uri="{9D8B030D-6E8A-4147-A177-3AD203B41FA5}">
+                      <a16:colId xmlns:a16="http://schemas.microsoft.com/office/drawing/2014/main" val="20001"/>
+                    </a:ext>
+                  </a:extLst>
+                </a:gridCol>
               </a:tblGrid>
               <a:tr h="2273847">
                 <a:tc>
@@ -4827,6 +4858,11 @@
                   </a:txBody>
                   <a:tcPr/>
                 </a:tc>
+                <a:extLst>
+                  <a:ext uri="{0D108BD9-81ED-4DB2-BD59-A6C34878D82A}">
+                    <a16:rowId xmlns:a16="http://schemas.microsoft.com/office/drawing/2014/main" val="10000"/>
+                  </a:ext>
+                </a:extLst>
               </a:tr>
             </a:tbl>
           </a:graphicData>
@@ -4969,9 +5005,27 @@
                 <a:tableStyleId>{5940675A-B579-460E-94D1-54222C63F5DA}</a:tableStyleId>
               </a:tblPr>
               <a:tblGrid>
-                <a:gridCol w="2133600"/>
-                <a:gridCol w="3657600"/>
-                <a:gridCol w="2438401"/>
+                <a:gridCol w="2133600">
+                  <a:extLst>
+                    <a:ext uri="{9D8B030D-6E8A-4147-A177-3AD203B41FA5}">
+                      <a16:colId xmlns:a16="http://schemas.microsoft.com/office/drawing/2014/main" val="20000"/>
+                    </a:ext>
+                  </a:extLst>
+                </a:gridCol>
+                <a:gridCol w="3657600">
+                  <a:extLst>
+                    <a:ext uri="{9D8B030D-6E8A-4147-A177-3AD203B41FA5}">
+                      <a16:colId xmlns:a16="http://schemas.microsoft.com/office/drawing/2014/main" val="20001"/>
+                    </a:ext>
+                  </a:extLst>
+                </a:gridCol>
+                <a:gridCol w="2438401">
+                  <a:extLst>
+                    <a:ext uri="{9D8B030D-6E8A-4147-A177-3AD203B41FA5}">
+                      <a16:colId xmlns:a16="http://schemas.microsoft.com/office/drawing/2014/main" val="20002"/>
+                    </a:ext>
+                  </a:extLst>
+                </a:gridCol>
               </a:tblGrid>
               <a:tr h="808715">
                 <a:tc rowSpan="2">
@@ -5119,6 +5173,11 @@
                   </a:txBody>
                   <a:tcPr/>
                 </a:tc>
+                <a:extLst>
+                  <a:ext uri="{0D108BD9-81ED-4DB2-BD59-A6C34878D82A}">
+                    <a16:rowId xmlns:a16="http://schemas.microsoft.com/office/drawing/2014/main" val="10000"/>
+                  </a:ext>
+                </a:extLst>
               </a:tr>
               <a:tr h="864948">
                 <a:tc vMerge="1">
@@ -5204,6 +5263,11 @@
                   </a:txBody>
                   <a:tcPr/>
                 </a:tc>
+                <a:extLst>
+                  <a:ext uri="{0D108BD9-81ED-4DB2-BD59-A6C34878D82A}">
+                    <a16:rowId xmlns:a16="http://schemas.microsoft.com/office/drawing/2014/main" val="10001"/>
+                  </a:ext>
+                </a:extLst>
               </a:tr>
               <a:tr h="864948">
                 <a:tc rowSpan="3">
@@ -5348,6 +5412,11 @@
                   </a:txBody>
                   <a:tcPr/>
                 </a:tc>
+                <a:extLst>
+                  <a:ext uri="{0D108BD9-81ED-4DB2-BD59-A6C34878D82A}">
+                    <a16:rowId xmlns:a16="http://schemas.microsoft.com/office/drawing/2014/main" val="10002"/>
+                  </a:ext>
+                </a:extLst>
               </a:tr>
               <a:tr h="895116">
                 <a:tc vMerge="1">
@@ -5433,6 +5502,11 @@
                   </a:txBody>
                   <a:tcPr/>
                 </a:tc>
+                <a:extLst>
+                  <a:ext uri="{0D108BD9-81ED-4DB2-BD59-A6C34878D82A}">
+                    <a16:rowId xmlns:a16="http://schemas.microsoft.com/office/drawing/2014/main" val="10003"/>
+                  </a:ext>
+                </a:extLst>
               </a:tr>
               <a:tr h="838200">
                 <a:tc vMerge="1">
@@ -5518,6 +5592,11 @@
                   </a:txBody>
                   <a:tcPr/>
                 </a:tc>
+                <a:extLst>
+                  <a:ext uri="{0D108BD9-81ED-4DB2-BD59-A6C34878D82A}">
+                    <a16:rowId xmlns:a16="http://schemas.microsoft.com/office/drawing/2014/main" val="10004"/>
+                  </a:ext>
+                </a:extLst>
               </a:tr>
             </a:tbl>
           </a:graphicData>
@@ -6090,182 +6169,6 @@
 </p:sld>
 </file>
 
-<file path=ppt/slides/slide17.xml><?xml version="1.0" encoding="utf-8"?>
-<p:sld xmlns:a="http://schemas.openxmlformats.org/drawingml/2006/main" xmlns:r="http://schemas.openxmlformats.org/officeDocument/2006/relationships" xmlns:p="http://schemas.openxmlformats.org/presentationml/2006/main">
-  <p:cSld>
-    <p:spTree>
-      <p:nvGrpSpPr>
-        <p:cNvPr id="1" name=""/>
-        <p:cNvGrpSpPr/>
-        <p:nvPr/>
-      </p:nvGrpSpPr>
-      <p:grpSpPr>
-        <a:xfrm>
-          <a:off x="0" y="0"/>
-          <a:ext cx="0" cy="0"/>
-          <a:chOff x="0" y="0"/>
-          <a:chExt cx="0" cy="0"/>
-        </a:xfrm>
-      </p:grpSpPr>
-      <p:pic>
-        <p:nvPicPr>
-          <p:cNvPr id="2050" name="Picture 2"/>
-          <p:cNvPicPr>
-            <a:picLocks noChangeAspect="1" noChangeArrowheads="1"/>
-          </p:cNvPicPr>
-          <p:nvPr/>
-        </p:nvPicPr>
-        <p:blipFill rotWithShape="1">
-          <a:blip r:embed="rId2">
-            <a:extLst>
-              <a:ext uri="{28A0092B-C50C-407E-A947-70E740481C1C}">
-                <a14:useLocalDpi xmlns:a14="http://schemas.microsoft.com/office/drawing/2010/main" val="0"/>
-              </a:ext>
-            </a:extLst>
-          </a:blip>
-          <a:srcRect l="36925" t="34721" r="36526" b="32640"/>
-          <a:stretch/>
-        </p:blipFill>
-        <p:spPr bwMode="auto">
-          <a:xfrm>
-            <a:off x="2362200" y="1524000"/>
-            <a:ext cx="4343400" cy="3002056"/>
-          </a:xfrm>
-          <a:prstGeom prst="rect">
-            <a:avLst/>
-          </a:prstGeom>
-          <a:noFill/>
-          <a:ln>
-            <a:noFill/>
-          </a:ln>
-          <a:extLst>
-            <a:ext uri="{909E8E84-426E-40DD-AFC4-6F175D3DCCD1}">
-              <a14:hiddenFill xmlns:a14="http://schemas.microsoft.com/office/drawing/2010/main">
-                <a:solidFill>
-                  <a:schemeClr val="accent1"/>
-                </a:solidFill>
-              </a14:hiddenFill>
-            </a:ext>
-            <a:ext uri="{91240B29-F687-4F45-9708-019B960494DF}">
-              <a14:hiddenLine xmlns:a14="http://schemas.microsoft.com/office/drawing/2010/main" w="9525">
-                <a:solidFill>
-                  <a:schemeClr val="tx1"/>
-                </a:solidFill>
-                <a:miter lim="800000"/>
-                <a:headEnd/>
-                <a:tailEnd/>
-              </a14:hiddenLine>
-            </a:ext>
-          </a:extLst>
-        </p:spPr>
-      </p:pic>
-      <p:pic>
-        <p:nvPicPr>
-          <p:cNvPr id="7" name="Picture 6"/>
-          <p:cNvPicPr>
-            <a:picLocks noChangeAspect="1"/>
-          </p:cNvPicPr>
-          <p:nvPr/>
-        </p:nvPicPr>
-        <p:blipFill>
-          <a:blip r:embed="rId3">
-            <a:extLst>
-              <a:ext uri="{28A0092B-C50C-407E-A947-70E740481C1C}">
-                <a14:useLocalDpi xmlns:a14="http://schemas.microsoft.com/office/drawing/2010/main" val="0"/>
-              </a:ext>
-            </a:extLst>
-          </a:blip>
-          <a:stretch>
-            <a:fillRect/>
-          </a:stretch>
-        </p:blipFill>
-        <p:spPr>
-          <a:xfrm>
-            <a:off x="651641" y="5715000"/>
-            <a:ext cx="3771900" cy="847725"/>
-          </a:xfrm>
-          <a:prstGeom prst="rect">
-            <a:avLst/>
-          </a:prstGeom>
-        </p:spPr>
-      </p:pic>
-      <p:sp>
-        <p:nvSpPr>
-          <p:cNvPr id="8" name="TextBox 7"/>
-          <p:cNvSpPr txBox="1"/>
-          <p:nvPr/>
-        </p:nvSpPr>
-        <p:spPr>
-          <a:xfrm>
-            <a:off x="4953000" y="5892225"/>
-            <a:ext cx="4072758" cy="584775"/>
-          </a:xfrm>
-          <a:prstGeom prst="rect">
-            <a:avLst/>
-          </a:prstGeom>
-          <a:noFill/>
-        </p:spPr>
-        <p:txBody>
-          <a:bodyPr wrap="square" rtlCol="0">
-            <a:spAutoFit/>
-          </a:bodyPr>
-          <a:lstStyle/>
-          <a:p>
-            <a:r>
-              <a:rPr lang="en-IE" sz="1600" dirty="0">
-                <a:solidFill>
-                  <a:schemeClr val="tx2">
-                    <a:lumMod val="75000"/>
-                  </a:schemeClr>
-                </a:solidFill>
-              </a:rPr>
-              <a:t>Department of </a:t>
-            </a:r>
-            <a:r>
-              <a:rPr lang="en-IE" sz="1600" dirty="0" smtClean="0">
-                <a:solidFill>
-                  <a:schemeClr val="tx2">
-                    <a:lumMod val="75000"/>
-                  </a:schemeClr>
-                </a:solidFill>
-              </a:rPr>
-              <a:t>Computing and Mathematics</a:t>
-            </a:r>
-          </a:p>
-          <a:p>
-            <a:r>
-              <a:rPr lang="en-IE" sz="1600" dirty="0">
-                <a:solidFill>
-                  <a:schemeClr val="tx2">
-                    <a:lumMod val="75000"/>
-                  </a:schemeClr>
-                </a:solidFill>
-              </a:rPr>
-              <a:t>http://www.wit.ie/</a:t>
-            </a:r>
-          </a:p>
-        </p:txBody>
-      </p:sp>
-    </p:spTree>
-    <p:extLst>
-      <p:ext uri="{BB962C8B-B14F-4D97-AF65-F5344CB8AC3E}">
-        <p14:creationId xmlns:p14="http://schemas.microsoft.com/office/powerpoint/2010/main" val="1441958265"/>
-      </p:ext>
-    </p:extLst>
-  </p:cSld>
-  <p:clrMapOvr>
-    <a:masterClrMapping/>
-  </p:clrMapOvr>
-  <p:timing>
-    <p:tnLst>
-      <p:par>
-        <p:cTn id="1" dur="indefinite" restart="never" nodeType="tmRoot"/>
-      </p:par>
-    </p:tnLst>
-  </p:timing>
-</p:sld>
-</file>
-
 <file path=ppt/slides/slide2.xml><?xml version="1.0" encoding="utf-8"?>
 <p:sld xmlns:a="http://schemas.openxmlformats.org/drawingml/2006/main" xmlns:r="http://schemas.openxmlformats.org/officeDocument/2006/relationships" xmlns:p="http://schemas.openxmlformats.org/presentationml/2006/main">
   <p:cSld>
@@ -6556,7 +6459,7 @@
         <p:spPr/>
         <p:txBody>
           <a:bodyPr>
-            <a:normAutofit fontScale="85000" lnSpcReduction="20000"/>
+            <a:normAutofit fontScale="77500" lnSpcReduction="20000"/>
           </a:bodyPr>
           <a:lstStyle/>
           <a:p>
@@ -6587,9 +6490,16 @@
             <a:endParaRPr lang="en-IE" dirty="0"/>
           </a:p>
           <a:p>
+            <a:endParaRPr lang="en-IE" dirty="0" smtClean="0"/>
+          </a:p>
+          <a:p>
             <a:r>
               <a:rPr lang="en-IE" dirty="0" smtClean="0"/>
-              <a:t>We need to store this information somewhere.</a:t>
+              <a:t>We </a:t>
+            </a:r>
+            <a:r>
+              <a:rPr lang="en-IE" dirty="0" smtClean="0"/>
+              <a:t>need to store this information somewhere.</a:t>
             </a:r>
           </a:p>
           <a:p>
@@ -6622,7 +6532,7 @@
         </p:blipFill>
         <p:spPr bwMode="auto">
           <a:xfrm>
-            <a:off x="1963271" y="2362200"/>
+            <a:off x="1676400" y="2438400"/>
             <a:ext cx="5490882" cy="2745441"/>
           </a:xfrm>
           <a:prstGeom prst="rect">
@@ -6785,12 +6695,9 @@
             <a:pPr lvl="1"/>
             <a:r>
               <a:rPr lang="en-IE" dirty="0" smtClean="0"/>
-              <a:t>name </a:t>
-            </a:r>
-            <a:r>
-              <a:rPr lang="en-IE" dirty="0"/>
-              <a:t>(also called an identifier) </a:t>
-            </a:r>
+              <a:t>name</a:t>
+            </a:r>
+            <a:endParaRPr lang="en-IE" dirty="0"/>
           </a:p>
           <a:p>
             <a:pPr lvl="1"/>
@@ -6880,7 +6787,7 @@
             <p:ph idx="1"/>
             <p:extLst>
               <p:ext uri="{D42A27DB-BD31-4B8C-83A1-F6EECF244321}">
-                <p14:modId xmlns:p14="http://schemas.microsoft.com/office/powerpoint/2010/main" val="763728210"/>
+                <p14:modId xmlns:p14="http://schemas.microsoft.com/office/powerpoint/2010/main" val="3695878694"/>
               </p:ext>
             </p:extLst>
           </p:nvPr>
@@ -6896,8 +6803,20 @@
                 <a:tableStyleId>{5940675A-B579-460E-94D1-54222C63F5DA}</a:tableStyleId>
               </a:tblPr>
               <a:tblGrid>
-                <a:gridCol w="1295400"/>
-                <a:gridCol w="6934200"/>
+                <a:gridCol w="1295400">
+                  <a:extLst>
+                    <a:ext uri="{9D8B030D-6E8A-4147-A177-3AD203B41FA5}">
+                      <a16:colId xmlns:a16="http://schemas.microsoft.com/office/drawing/2014/main" val="20000"/>
+                    </a:ext>
+                  </a:extLst>
+                </a:gridCol>
+                <a:gridCol w="6934200">
+                  <a:extLst>
+                    <a:ext uri="{9D8B030D-6E8A-4147-A177-3AD203B41FA5}">
+                      <a16:colId xmlns:a16="http://schemas.microsoft.com/office/drawing/2014/main" val="20001"/>
+                    </a:ext>
+                  </a:extLst>
+                </a:gridCol>
               </a:tblGrid>
               <a:tr h="370840">
                 <a:tc>
@@ -6912,7 +6831,14 @@
                       <a:endParaRPr lang="en-IE" sz="2400" b="1" dirty="0"/>
                     </a:p>
                   </a:txBody>
-                  <a:tcPr/>
+                  <a:tcPr>
+                    <a:solidFill>
+                      <a:schemeClr val="accent1">
+                        <a:lumMod val="20000"/>
+                        <a:lumOff val="80000"/>
+                      </a:schemeClr>
+                    </a:solidFill>
+                  </a:tcPr>
                 </a:tc>
                 <a:tc>
                   <a:txBody>
@@ -6926,8 +6852,20 @@
                       <a:endParaRPr lang="en-IE" sz="2400" b="1" dirty="0"/>
                     </a:p>
                   </a:txBody>
-                  <a:tcPr/>
+                  <a:tcPr>
+                    <a:solidFill>
+                      <a:schemeClr val="accent1">
+                        <a:lumMod val="20000"/>
+                        <a:lumOff val="80000"/>
+                      </a:schemeClr>
+                    </a:solidFill>
+                  </a:tcPr>
                 </a:tc>
+                <a:extLst>
+                  <a:ext uri="{0D108BD9-81ED-4DB2-BD59-A6C34878D82A}">
+                    <a16:rowId xmlns:a16="http://schemas.microsoft.com/office/drawing/2014/main" val="10000"/>
+                  </a:ext>
+                </a:extLst>
               </a:tr>
               <a:tr h="370840">
                 <a:tc>
@@ -6942,7 +6880,14 @@
                       <a:endParaRPr lang="en-IE" sz="2400" dirty="0"/>
                     </a:p>
                   </a:txBody>
-                  <a:tcPr/>
+                  <a:tcPr>
+                    <a:solidFill>
+                      <a:schemeClr val="accent1">
+                        <a:lumMod val="20000"/>
+                        <a:lumOff val="80000"/>
+                      </a:schemeClr>
+                    </a:solidFill>
+                  </a:tcPr>
                 </a:tc>
                 <a:tc>
                   <a:txBody>
@@ -6951,7 +6896,7 @@
                     <a:p>
                       <a:r>
                         <a:rPr lang="en-IE" sz="2400" dirty="0" smtClean="0"/>
-                        <a:t>counter</a:t>
+                        <a:t>Counter</a:t>
                       </a:r>
                       <a:endParaRPr lang="en-IE" sz="2400" dirty="0">
                         <a:solidFill>
@@ -6962,6 +6907,11 @@
                   </a:txBody>
                   <a:tcPr/>
                 </a:tc>
+                <a:extLst>
+                  <a:ext uri="{0D108BD9-81ED-4DB2-BD59-A6C34878D82A}">
+                    <a16:rowId xmlns:a16="http://schemas.microsoft.com/office/drawing/2014/main" val="10001"/>
+                  </a:ext>
+                </a:extLst>
               </a:tr>
               <a:tr h="370840">
                 <a:tc>
@@ -6976,7 +6926,14 @@
                       <a:endParaRPr lang="en-IE" sz="2400" dirty="0"/>
                     </a:p>
                   </a:txBody>
-                  <a:tcPr/>
+                  <a:tcPr>
+                    <a:solidFill>
+                      <a:schemeClr val="accent1">
+                        <a:lumMod val="20000"/>
+                        <a:lumOff val="80000"/>
+                      </a:schemeClr>
+                    </a:solidFill>
+                  </a:tcPr>
                 </a:tc>
                 <a:tc>
                   <a:txBody>
@@ -6996,6 +6953,11 @@
                   </a:txBody>
                   <a:tcPr/>
                 </a:tc>
+                <a:extLst>
+                  <a:ext uri="{0D108BD9-81ED-4DB2-BD59-A6C34878D82A}">
+                    <a16:rowId xmlns:a16="http://schemas.microsoft.com/office/drawing/2014/main" val="10002"/>
+                  </a:ext>
+                </a:extLst>
               </a:tr>
               <a:tr h="370840">
                 <a:tc>
@@ -7030,7 +6992,14 @@
                       <a:endParaRPr lang="en-IE" sz="2400" dirty="0"/>
                     </a:p>
                   </a:txBody>
-                  <a:tcPr/>
+                  <a:tcPr>
+                    <a:solidFill>
+                      <a:schemeClr val="accent1">
+                        <a:lumMod val="20000"/>
+                        <a:lumOff val="80000"/>
+                      </a:schemeClr>
+                    </a:solidFill>
+                  </a:tcPr>
                 </a:tc>
                 <a:tc>
                   <a:txBody>
@@ -7058,6 +7027,11 @@
                   </a:txBody>
                   <a:tcPr/>
                 </a:tc>
+                <a:extLst>
+                  <a:ext uri="{0D108BD9-81ED-4DB2-BD59-A6C34878D82A}">
+                    <a16:rowId xmlns:a16="http://schemas.microsoft.com/office/drawing/2014/main" val="10003"/>
+                  </a:ext>
+                </a:extLst>
               </a:tr>
             </a:tbl>
           </a:graphicData>
@@ -7413,8 +7387,20 @@
                 <a:tableStyleId>{5940675A-B579-460E-94D1-54222C63F5DA}</a:tableStyleId>
               </a:tblPr>
               <a:tblGrid>
-                <a:gridCol w="3810000"/>
-                <a:gridCol w="3810000"/>
+                <a:gridCol w="3810000">
+                  <a:extLst>
+                    <a:ext uri="{9D8B030D-6E8A-4147-A177-3AD203B41FA5}">
+                      <a16:colId xmlns:a16="http://schemas.microsoft.com/office/drawing/2014/main" val="20000"/>
+                    </a:ext>
+                  </a:extLst>
+                </a:gridCol>
+                <a:gridCol w="3810000">
+                  <a:extLst>
+                    <a:ext uri="{9D8B030D-6E8A-4147-A177-3AD203B41FA5}">
+                      <a16:colId xmlns:a16="http://schemas.microsoft.com/office/drawing/2014/main" val="20001"/>
+                    </a:ext>
+                  </a:extLst>
+                </a:gridCol>
               </a:tblGrid>
               <a:tr h="1144524">
                 <a:tc>
@@ -7457,6 +7443,11 @@
                   </a:txBody>
                   <a:tcPr/>
                 </a:tc>
+                <a:extLst>
+                  <a:ext uri="{0D108BD9-81ED-4DB2-BD59-A6C34878D82A}">
+                    <a16:rowId xmlns:a16="http://schemas.microsoft.com/office/drawing/2014/main" val="10000"/>
+                  </a:ext>
+                </a:extLst>
               </a:tr>
               <a:tr h="1345602">
                 <a:tc>
@@ -7507,6 +7498,11 @@
                   </a:txBody>
                   <a:tcPr/>
                 </a:tc>
+                <a:extLst>
+                  <a:ext uri="{0D108BD9-81ED-4DB2-BD59-A6C34878D82A}">
+                    <a16:rowId xmlns:a16="http://schemas.microsoft.com/office/drawing/2014/main" val="10001"/>
+                  </a:ext>
+                </a:extLst>
               </a:tr>
             </a:tbl>
           </a:graphicData>

</xml_diff>